<commit_message>
Final model, hopefully. ALso updated ppt
</commit_message>
<xml_diff>
--- a/powerpoint.ppt.pptx
+++ b/powerpoint.ppt.pptx
@@ -108,6 +108,11 @@
       </a:defRPr>
     </a:lvl9pPr>
   </p:defaultTextStyle>
+  <p:extLst>
+    <p:ext uri="{EFAFB233-063F-42B5-8137-9DF3F51BA10A}">
+      <p15:sldGuideLst xmlns:p15="http://schemas.microsoft.com/office/powerpoint/2012/main"/>
+    </p:ext>
+  </p:extLst>
 </p:presentation>
 </file>
 
@@ -242,7 +247,7 @@
           <a:p>
             <a:fld id="{8D26A8B0-31C9-42DA-996E-14BE3A3E6E85}" type="datetimeFigureOut">
               <a:rPr lang="en-US" smtClean="0"/>
-              <a:t>10/26/2017</a:t>
+              <a:t>10/29/2017</a:t>
             </a:fld>
             <a:endParaRPr lang="en-US"/>
           </a:p>
@@ -412,7 +417,7 @@
           <a:p>
             <a:fld id="{8D26A8B0-31C9-42DA-996E-14BE3A3E6E85}" type="datetimeFigureOut">
               <a:rPr lang="en-US" smtClean="0"/>
-              <a:t>10/26/2017</a:t>
+              <a:t>10/29/2017</a:t>
             </a:fld>
             <a:endParaRPr lang="en-US"/>
           </a:p>
@@ -592,7 +597,7 @@
           <a:p>
             <a:fld id="{8D26A8B0-31C9-42DA-996E-14BE3A3E6E85}" type="datetimeFigureOut">
               <a:rPr lang="en-US" smtClean="0"/>
-              <a:t>10/26/2017</a:t>
+              <a:t>10/29/2017</a:t>
             </a:fld>
             <a:endParaRPr lang="en-US"/>
           </a:p>
@@ -762,7 +767,7 @@
           <a:p>
             <a:fld id="{8D26A8B0-31C9-42DA-996E-14BE3A3E6E85}" type="datetimeFigureOut">
               <a:rPr lang="en-US" smtClean="0"/>
-              <a:t>10/26/2017</a:t>
+              <a:t>10/29/2017</a:t>
             </a:fld>
             <a:endParaRPr lang="en-US"/>
           </a:p>
@@ -1008,7 +1013,7 @@
           <a:p>
             <a:fld id="{8D26A8B0-31C9-42DA-996E-14BE3A3E6E85}" type="datetimeFigureOut">
               <a:rPr lang="en-US" smtClean="0"/>
-              <a:t>10/26/2017</a:t>
+              <a:t>10/29/2017</a:t>
             </a:fld>
             <a:endParaRPr lang="en-US"/>
           </a:p>
@@ -1240,7 +1245,7 @@
           <a:p>
             <a:fld id="{8D26A8B0-31C9-42DA-996E-14BE3A3E6E85}" type="datetimeFigureOut">
               <a:rPr lang="en-US" smtClean="0"/>
-              <a:t>10/26/2017</a:t>
+              <a:t>10/29/2017</a:t>
             </a:fld>
             <a:endParaRPr lang="en-US"/>
           </a:p>
@@ -1607,7 +1612,7 @@
           <a:p>
             <a:fld id="{8D26A8B0-31C9-42DA-996E-14BE3A3E6E85}" type="datetimeFigureOut">
               <a:rPr lang="en-US" smtClean="0"/>
-              <a:t>10/26/2017</a:t>
+              <a:t>10/29/2017</a:t>
             </a:fld>
             <a:endParaRPr lang="en-US"/>
           </a:p>
@@ -1725,7 +1730,7 @@
           <a:p>
             <a:fld id="{8D26A8B0-31C9-42DA-996E-14BE3A3E6E85}" type="datetimeFigureOut">
               <a:rPr lang="en-US" smtClean="0"/>
-              <a:t>10/26/2017</a:t>
+              <a:t>10/29/2017</a:t>
             </a:fld>
             <a:endParaRPr lang="en-US"/>
           </a:p>
@@ -1820,7 +1825,7 @@
           <a:p>
             <a:fld id="{8D26A8B0-31C9-42DA-996E-14BE3A3E6E85}" type="datetimeFigureOut">
               <a:rPr lang="en-US" smtClean="0"/>
-              <a:t>10/26/2017</a:t>
+              <a:t>10/29/2017</a:t>
             </a:fld>
             <a:endParaRPr lang="en-US"/>
           </a:p>
@@ -2097,7 +2102,7 @@
           <a:p>
             <a:fld id="{8D26A8B0-31C9-42DA-996E-14BE3A3E6E85}" type="datetimeFigureOut">
               <a:rPr lang="en-US" smtClean="0"/>
-              <a:t>10/26/2017</a:t>
+              <a:t>10/29/2017</a:t>
             </a:fld>
             <a:endParaRPr lang="en-US"/>
           </a:p>
@@ -2350,7 +2355,7 @@
           <a:p>
             <a:fld id="{8D26A8B0-31C9-42DA-996E-14BE3A3E6E85}" type="datetimeFigureOut">
               <a:rPr lang="en-US" smtClean="0"/>
-              <a:t>10/26/2017</a:t>
+              <a:t>10/29/2017</a:t>
             </a:fld>
             <a:endParaRPr lang="en-US"/>
           </a:p>
@@ -2563,7 +2568,7 @@
           <a:p>
             <a:fld id="{8D26A8B0-31C9-42DA-996E-14BE3A3E6E85}" type="datetimeFigureOut">
               <a:rPr lang="en-US" smtClean="0"/>
-              <a:t>10/26/2017</a:t>
+              <a:t>10/29/2017</a:t>
             </a:fld>
             <a:endParaRPr lang="en-US"/>
           </a:p>
@@ -4157,38 +4162,140 @@
           </a:p>
         </p:txBody>
       </p:sp>
-      <p:sp>
-        <p:nvSpPr>
-          <p:cNvPr id="3" name="Content Placeholder 2"/>
-          <p:cNvSpPr>
-            <a:spLocks noGrp="1"/>
-          </p:cNvSpPr>
-          <p:nvPr>
-            <p:ph idx="1"/>
-          </p:nvPr>
-        </p:nvSpPr>
-        <p:spPr/>
-        <p:txBody>
-          <a:bodyPr/>
-          <a:lstStyle/>
-          <a:p>
-            <a:pPr marL="0" indent="0">
-              <a:buNone/>
-            </a:pPr>
+      <p:pic>
+        <p:nvPicPr>
+          <p:cNvPr id="4" name="Picture 3"/>
+          <p:cNvPicPr>
+            <a:picLocks noChangeAspect="1"/>
+          </p:cNvPicPr>
+          <p:nvPr/>
+        </p:nvPicPr>
+        <p:blipFill>
+          <a:blip r:embed="rId2">
+            <a:extLst>
+              <a:ext uri="{28A0092B-C50C-407E-A947-70E740481C1C}">
+                <a14:useLocalDpi xmlns:a14="http://schemas.microsoft.com/office/drawing/2010/main" val="0"/>
+              </a:ext>
+            </a:extLst>
+          </a:blip>
+          <a:stretch>
+            <a:fillRect/>
+          </a:stretch>
+        </p:blipFill>
+        <p:spPr>
+          <a:xfrm>
+            <a:off x="838200" y="1337669"/>
+            <a:ext cx="10938878" cy="4871937"/>
+          </a:xfrm>
+          <a:prstGeom prst="rect">
+            <a:avLst/>
+          </a:prstGeom>
+        </p:spPr>
+      </p:pic>
+      <p:sp>
+        <p:nvSpPr>
+          <p:cNvPr id="5" name="TextBox 4"/>
+          <p:cNvSpPr txBox="1"/>
+          <p:nvPr/>
+        </p:nvSpPr>
+        <p:spPr>
+          <a:xfrm>
+            <a:off x="9150256" y="2063067"/>
+            <a:ext cx="2626822" cy="3416320"/>
+          </a:xfrm>
+          <a:prstGeom prst="rect">
+            <a:avLst/>
+          </a:prstGeom>
+          <a:noFill/>
+        </p:spPr>
+        <p:txBody>
+          <a:bodyPr wrap="square" rtlCol="0">
+            <a:spAutoFit/>
+          </a:bodyPr>
+          <a:lstStyle/>
+          <a:p>
+            <a:r>
+              <a:rPr lang="en-US" sz="3600" b="1" dirty="0" smtClean="0">
+                <a:solidFill>
+                  <a:srgbClr val="92D050"/>
+                </a:solidFill>
+              </a:rPr>
+              <a:t>-</a:t>
+            </a:r>
+            <a:r>
+              <a:rPr lang="en-US" sz="3600" b="1" dirty="0" smtClean="0"/>
+              <a:t> </a:t>
+            </a:r>
             <a:r>
               <a:rPr lang="en-US" dirty="0" smtClean="0"/>
-              <a:t>Graph with four curves of same person with the same dosage:</a:t>
-            </a:r>
-          </a:p>
-          <a:p>
-            <a:pPr marL="0" indent="0">
-              <a:buNone/>
-            </a:pPr>
+              <a:t>One-Compartment without eating</a:t>
+            </a:r>
+            <a:endParaRPr lang="en-US" sz="3600" b="1" dirty="0" smtClean="0"/>
+          </a:p>
+          <a:p>
+            <a:r>
+              <a:rPr lang="en-US" sz="3600" b="1" dirty="0" smtClean="0">
+                <a:solidFill>
+                  <a:schemeClr val="accent1"/>
+                </a:solidFill>
+              </a:rPr>
+              <a:t>-</a:t>
+            </a:r>
+            <a:r>
+              <a:rPr lang="en-US" sz="3600" b="1" dirty="0" smtClean="0"/>
+              <a:t> </a:t>
+            </a:r>
+            <a:r>
+              <a:rPr lang="en-US" dirty="0"/>
+              <a:t>One-Compartment </a:t>
+            </a:r>
             <a:r>
               <a:rPr lang="en-US" dirty="0" smtClean="0"/>
-              <a:t>The </a:t>
-            </a:r>
-            <a:endParaRPr lang="en-US" dirty="0"/>
+              <a:t>with </a:t>
+            </a:r>
+            <a:r>
+              <a:rPr lang="en-US" dirty="0"/>
+              <a:t>eating</a:t>
+            </a:r>
+            <a:endParaRPr lang="en-US" sz="3600" b="1" dirty="0" smtClean="0"/>
+          </a:p>
+          <a:p>
+            <a:r>
+              <a:rPr lang="en-US" sz="3600" b="1" dirty="0" smtClean="0">
+                <a:solidFill>
+                  <a:srgbClr val="FF0000"/>
+                </a:solidFill>
+              </a:rPr>
+              <a:t>- </a:t>
+            </a:r>
+            <a:r>
+              <a:rPr lang="en-US" dirty="0" smtClean="0"/>
+              <a:t>Three-Compartment, without eating</a:t>
+            </a:r>
+            <a:endParaRPr lang="en-US" sz="3600" b="1" dirty="0" smtClean="0">
+              <a:solidFill>
+                <a:srgbClr val="FF0000"/>
+              </a:solidFill>
+            </a:endParaRPr>
+          </a:p>
+          <a:p>
+            <a:r>
+              <a:rPr lang="en-US" sz="3600" b="1" dirty="0" smtClean="0">
+                <a:solidFill>
+                  <a:srgbClr val="7030A0"/>
+                </a:solidFill>
+              </a:rPr>
+              <a:t>-</a:t>
+            </a:r>
+            <a:r>
+              <a:rPr lang="en-US" sz="3600" b="1" dirty="0" smtClean="0"/>
+              <a:t> </a:t>
+            </a:r>
+            <a:r>
+              <a:rPr lang="en-US" dirty="0" smtClean="0"/>
+              <a:t>Three-Compartment, with eating</a:t>
+            </a:r>
+            <a:endParaRPr lang="en-US" sz="3600" b="1" dirty="0"/>
           </a:p>
         </p:txBody>
       </p:sp>
@@ -4262,11 +4369,37 @@
           <a:p>
             <a:r>
               <a:rPr lang="en-US" dirty="0" smtClean="0"/>
-              <a:t>Three-compartment is far more comprehensive</a:t>
-            </a:r>
-          </a:p>
-          <a:p>
+              <a:t>Eatin</a:t>
+            </a:r>
+            <a:r>
+              <a:rPr lang="en-US" dirty="0" smtClean="0"/>
+              <a:t>g decreases theoretical BAC significantly</a:t>
+            </a:r>
+          </a:p>
+          <a:p>
+            <a:r>
+              <a:rPr lang="en-US" b="1" dirty="0" smtClean="0"/>
+              <a:t>Something quantitative about the impact of eating</a:t>
+            </a:r>
+            <a:endParaRPr lang="en-US" b="1" dirty="0" smtClean="0"/>
+          </a:p>
+          <a:p>
+            <a:r>
+              <a:rPr lang="en-US" dirty="0" smtClean="0"/>
+              <a:t>Three-compartment model is </a:t>
+            </a:r>
+            <a:r>
+              <a:rPr lang="en-US" dirty="0" smtClean="0"/>
+              <a:t>far more </a:t>
+            </a:r>
+            <a:r>
+              <a:rPr lang="en-US" dirty="0" smtClean="0"/>
+              <a:t>comprehensive</a:t>
+            </a:r>
             <a:endParaRPr lang="en-US" dirty="0"/>
+          </a:p>
+          <a:p>
+            <a:endParaRPr lang="en-US" dirty="0" smtClean="0"/>
           </a:p>
         </p:txBody>
       </p:sp>

</xml_diff>

<commit_message>
sharpened the graph in ppt and added a step to linrange
</commit_message>
<xml_diff>
--- a/powerpoint.ppt.pptx
+++ b/powerpoint.ppt.pptx
@@ -4173,6 +4173,18 @@
         <p:blipFill>
           <a:blip r:embed="rId2">
             <a:extLst>
+              <a:ext uri="{BEBA8EAE-BF5A-486C-A8C5-ECC9F3942E4B}">
+                <a14:imgProps xmlns:a14="http://schemas.microsoft.com/office/drawing/2010/main">
+                  <a14:imgLayer r:embed="rId3">
+                    <a14:imgEffect>
+                      <a14:sharpenSoften amount="50000"/>
+                    </a14:imgEffect>
+                    <a14:imgEffect>
+                      <a14:brightnessContrast contrast="20000"/>
+                    </a14:imgEffect>
+                  </a14:imgLayer>
+                </a14:imgProps>
+              </a:ext>
               <a:ext uri="{28A0092B-C50C-407E-A947-70E740481C1C}">
                 <a14:useLocalDpi xmlns:a14="http://schemas.microsoft.com/office/drawing/2010/main" val="0"/>
               </a:ext>
@@ -4369,11 +4381,7 @@
           <a:p>
             <a:r>
               <a:rPr lang="en-US" dirty="0" smtClean="0"/>
-              <a:t>Eatin</a:t>
-            </a:r>
-            <a:r>
-              <a:rPr lang="en-US" dirty="0" smtClean="0"/>
-              <a:t>g decreases theoretical BAC significantly</a:t>
+              <a:t>Eating decreases theoretical BAC significantly</a:t>
             </a:r>
           </a:p>
           <a:p>
@@ -4381,20 +4389,11 @@
               <a:rPr lang="en-US" b="1" dirty="0" smtClean="0"/>
               <a:t>Something quantitative about the impact of eating</a:t>
             </a:r>
-            <a:endParaRPr lang="en-US" b="1" dirty="0" smtClean="0"/>
           </a:p>
           <a:p>
             <a:r>
               <a:rPr lang="en-US" dirty="0" smtClean="0"/>
-              <a:t>Three-compartment model is </a:t>
-            </a:r>
-            <a:r>
-              <a:rPr lang="en-US" dirty="0" smtClean="0"/>
-              <a:t>far more </a:t>
-            </a:r>
-            <a:r>
-              <a:rPr lang="en-US" dirty="0" smtClean="0"/>
-              <a:t>comprehensive</a:t>
+              <a:t>Three-compartment model is far more comprehensive</a:t>
             </a:r>
             <a:endParaRPr lang="en-US" dirty="0"/>
           </a:p>

</xml_diff>

<commit_message>
"final changes made yeaterday during presentation. Swept everything for 6 shots and modified the graphs in ppt.pptx."
</commit_message>
<xml_diff>
--- a/powerpoint.ppt.pptx
+++ b/powerpoint.ppt.pptx
@@ -3063,6 +3063,13 @@
   <p:clrMapOvr>
     <a:masterClrMapping/>
   </p:clrMapOvr>
+  <p:timing>
+    <p:tnLst>
+      <p:par>
+        <p:cTn id="1" dur="indefinite" restart="never" nodeType="tmRoot"/>
+      </p:par>
+    </p:tnLst>
+  </p:timing>
 </p:sld>
 </file>
 
@@ -3205,6 +3212,13 @@
   <p:clrMapOvr>
     <a:masterClrMapping/>
   </p:clrMapOvr>
+  <p:timing>
+    <p:tnLst>
+      <p:par>
+        <p:cTn id="1" dur="indefinite" restart="never" nodeType="tmRoot"/>
+      </p:par>
+    </p:tnLst>
+  </p:timing>
 </p:sld>
 </file>
 
@@ -4120,6 +4134,13 @@
   <p:clrMapOvr>
     <a:masterClrMapping/>
   </p:clrMapOvr>
+  <p:timing>
+    <p:tnLst>
+      <p:par>
+        <p:cTn id="1" dur="indefinite" restart="never" nodeType="tmRoot"/>
+      </p:par>
+    </p:tnLst>
+  </p:timing>
 </p:sld>
 </file>
 
@@ -4170,7 +4191,7 @@
       </p:sp>
       <p:pic>
         <p:nvPicPr>
-          <p:cNvPr id="4" name="Picture 3"/>
+          <p:cNvPr id="3" name="Picture 2"/>
           <p:cNvPicPr>
             <a:picLocks noChangeAspect="1"/>
           </p:cNvPicPr>
@@ -4179,18 +4200,6 @@
         <p:blipFill>
           <a:blip r:embed="rId2">
             <a:extLst>
-              <a:ext uri="{BEBA8EAE-BF5A-486C-A8C5-ECC9F3942E4B}">
-                <a14:imgProps xmlns:a14="http://schemas.microsoft.com/office/drawing/2010/main">
-                  <a14:imgLayer r:embed="rId3">
-                    <a14:imgEffect>
-                      <a14:sharpenSoften amount="50000"/>
-                    </a14:imgEffect>
-                    <a14:imgEffect>
-                      <a14:brightnessContrast contrast="20000"/>
-                    </a14:imgEffect>
-                  </a14:imgLayer>
-                </a14:imgProps>
-              </a:ext>
               <a:ext uri="{28A0092B-C50C-407E-A947-70E740481C1C}">
                 <a14:useLocalDpi xmlns:a14="http://schemas.microsoft.com/office/drawing/2010/main" val="0"/>
               </a:ext>
@@ -4202,8 +4211,8 @@
         </p:blipFill>
         <p:spPr>
           <a:xfrm>
-            <a:off x="838200" y="1337669"/>
-            <a:ext cx="10938878" cy="4871937"/>
+            <a:off x="838200" y="1504421"/>
+            <a:ext cx="10122260" cy="4751523"/>
           </a:xfrm>
           <a:prstGeom prst="rect">
             <a:avLst/>
@@ -4235,7 +4244,7 @@
             <a:r>
               <a:rPr lang="en-US" sz="3600" b="1" dirty="0" smtClean="0">
                 <a:solidFill>
-                  <a:srgbClr val="92D050"/>
+                  <a:schemeClr val="accent1"/>
                 </a:solidFill>
               </a:rPr>
               <a:t>-</a:t>
@@ -4254,7 +4263,7 @@
             <a:r>
               <a:rPr lang="en-US" sz="3600" b="1" dirty="0" smtClean="0">
                 <a:solidFill>
-                  <a:schemeClr val="accent1"/>
+                  <a:schemeClr val="accent6"/>
                 </a:solidFill>
               </a:rPr>
               <a:t>-</a:t>
@@ -4327,6 +4336,13 @@
   <p:clrMapOvr>
     <a:masterClrMapping/>
   </p:clrMapOvr>
+  <p:timing>
+    <p:tnLst>
+      <p:par>
+        <p:cTn id="1" dur="indefinite" restart="never" nodeType="tmRoot"/>
+      </p:par>
+    </p:tnLst>
+  </p:timing>
 </p:sld>
 </file>
 
@@ -4600,6 +4616,13 @@
   <p:clrMapOvr>
     <a:masterClrMapping/>
   </p:clrMapOvr>
+  <p:timing>
+    <p:tnLst>
+      <p:par>
+        <p:cTn id="1" dur="indefinite" restart="never" nodeType="tmRoot"/>
+      </p:par>
+    </p:tnLst>
+  </p:timing>
 </p:sld>
 </file>
 
@@ -4660,11 +4683,7 @@
           <a:p>
             <a:r>
               <a:rPr lang="en-US" dirty="0" smtClean="0"/>
-              <a:t>Eating </a:t>
-            </a:r>
-            <a:r>
-              <a:rPr lang="en-US" dirty="0" smtClean="0"/>
-              <a:t>decreases theoretical BAC significantly</a:t>
+              <a:t>Eating decreases theoretical BAC significantly</a:t>
             </a:r>
           </a:p>
           <a:p>
@@ -4672,16 +4691,11 @@
               <a:rPr lang="en-US" dirty="0" smtClean="0"/>
               <a:t>According to the one compartment model, gain in 2.6 kg decreases BAC by one shot (15 g of pure ethanol)</a:t>
             </a:r>
-            <a:endParaRPr lang="en-US" dirty="0" smtClean="0"/>
           </a:p>
           <a:p>
             <a:r>
               <a:rPr lang="en-US" dirty="0" smtClean="0"/>
-              <a:t>Three-compartment model is far more </a:t>
-            </a:r>
-            <a:r>
-              <a:rPr lang="en-US" dirty="0" smtClean="0"/>
-              <a:t>comprehensive but more finicky</a:t>
+              <a:t>Three-compartment model is far more comprehensive but more finicky</a:t>
             </a:r>
             <a:endParaRPr lang="en-US" dirty="0"/>
           </a:p>
@@ -4700,6 +4714,13 @@
   <p:clrMapOvr>
     <a:masterClrMapping/>
   </p:clrMapOvr>
+  <p:timing>
+    <p:tnLst>
+      <p:par>
+        <p:cTn id="1" dur="indefinite" restart="never" nodeType="tmRoot"/>
+      </p:par>
+    </p:tnLst>
+  </p:timing>
 </p:sld>
 </file>
 

</xml_diff>